<commit_message>
stratify random select built-up samples
</commit_message>
<xml_diff>
--- a/The Work Flow/00_Comunicating/20200905_交流.pptx
+++ b/The Work Flow/00_Comunicating/20200905_交流.pptx
@@ -321,7 +321,7 @@
           <a:p>
             <a:fld id="{82F288E0-7875-42C4-84C8-98DBBD3BF4D2}" type="datetimeFigureOut">
               <a:rPr lang="zh-CN" altLang="en-US" smtClean="0"/>
-              <a:t>2020/9/5</a:t>
+              <a:t>2020/9/20</a:t>
             </a:fld>
             <a:endParaRPr lang="zh-CN" altLang="en-US"/>
           </a:p>
@@ -479,7 +479,7 @@
           <a:p>
             <a:fld id="{82F288E0-7875-42C4-84C8-98DBBD3BF4D2}" type="datetimeFigureOut">
               <a:rPr lang="zh-CN" altLang="en-US" smtClean="0"/>
-              <a:t>2020/9/5</a:t>
+              <a:t>2020/9/20</a:t>
             </a:fld>
             <a:endParaRPr lang="zh-CN" altLang="en-US"/>
           </a:p>
@@ -654,7 +654,7 @@
           <a:p>
             <a:fld id="{82F288E0-7875-42C4-84C8-98DBBD3BF4D2}" type="datetimeFigureOut">
               <a:rPr lang="zh-CN" altLang="en-US" smtClean="0"/>
-              <a:t>2020/9/5</a:t>
+              <a:t>2020/9/20</a:t>
             </a:fld>
             <a:endParaRPr lang="zh-CN" altLang="en-US"/>
           </a:p>
@@ -906,7 +906,7 @@
           <a:p>
             <a:fld id="{82F288E0-7875-42C4-84C8-98DBBD3BF4D2}" type="datetimeFigureOut">
               <a:rPr lang="zh-CN" altLang="en-US" smtClean="0"/>
-              <a:t>2020/9/5</a:t>
+              <a:t>2020/9/20</a:t>
             </a:fld>
             <a:endParaRPr lang="zh-CN" altLang="en-US"/>
           </a:p>
@@ -1142,7 +1142,7 @@
           <a:p>
             <a:fld id="{82F288E0-7875-42C4-84C8-98DBBD3BF4D2}" type="datetimeFigureOut">
               <a:rPr lang="zh-CN" altLang="en-US" smtClean="0"/>
-              <a:t>2020/9/5</a:t>
+              <a:t>2020/9/20</a:t>
             </a:fld>
             <a:endParaRPr lang="zh-CN" altLang="en-US"/>
           </a:p>
@@ -1513,7 +1513,7 @@
           <a:p>
             <a:fld id="{82F288E0-7875-42C4-84C8-98DBBD3BF4D2}" type="datetimeFigureOut">
               <a:rPr lang="zh-CN" altLang="en-US" smtClean="0"/>
-              <a:t>2020/9/5</a:t>
+              <a:t>2020/9/20</a:t>
             </a:fld>
             <a:endParaRPr lang="zh-CN" altLang="en-US"/>
           </a:p>
@@ -2448,7 +2448,7 @@
           <a:p>
             <a:fld id="{82F288E0-7875-42C4-84C8-98DBBD3BF4D2}" type="datetimeFigureOut">
               <a:rPr lang="zh-CN" altLang="en-US" smtClean="0"/>
-              <a:t>2020/9/5</a:t>
+              <a:t>2020/9/20</a:t>
             </a:fld>
             <a:endParaRPr lang="zh-CN" altLang="en-US"/>
           </a:p>
@@ -2550,7 +2550,7 @@
           <a:p>
             <a:fld id="{82F288E0-7875-42C4-84C8-98DBBD3BF4D2}" type="datetimeFigureOut">
               <a:rPr lang="zh-CN" altLang="en-US" smtClean="0"/>
-              <a:t>2020/9/5</a:t>
+              <a:t>2020/9/20</a:t>
             </a:fld>
             <a:endParaRPr lang="zh-CN" altLang="en-US"/>
           </a:p>
@@ -2809,7 +2809,7 @@
           <a:p>
             <a:fld id="{82F288E0-7875-42C4-84C8-98DBBD3BF4D2}" type="datetimeFigureOut">
               <a:rPr lang="zh-CN" altLang="en-US" smtClean="0"/>
-              <a:t>2020/9/5</a:t>
+              <a:t>2020/9/20</a:t>
             </a:fld>
             <a:endParaRPr lang="zh-CN" altLang="en-US"/>
           </a:p>
@@ -2994,7 +2994,7 @@
           <a:p>
             <a:fld id="{82F288E0-7875-42C4-84C8-98DBBD3BF4D2}" type="datetimeFigureOut">
               <a:rPr lang="zh-CN" altLang="en-US" smtClean="0"/>
-              <a:t>2020/9/5</a:t>
+              <a:t>2020/9/20</a:t>
             </a:fld>
             <a:endParaRPr lang="zh-CN" altLang="en-US"/>
           </a:p>
@@ -3215,7 +3215,7 @@
           <a:p>
             <a:fld id="{82F288E0-7875-42C4-84C8-98DBBD3BF4D2}" type="datetimeFigureOut">
               <a:rPr lang="zh-CN" altLang="en-US" smtClean="0"/>
-              <a:t>2020/9/5</a:t>
+              <a:t>2020/9/20</a:t>
             </a:fld>
             <a:endParaRPr lang="zh-CN" altLang="en-US"/>
           </a:p>

</xml_diff>